<commit_message>
Complete search slides and codes
</commit_message>
<xml_diff>
--- a/data structures/Estructuras de Datos I.pptx
+++ b/data structures/Estructuras de Datos I.pptx
@@ -258,7 +258,7 @@
             <a:fld id="{F4FAB538-628E-104D-8583-83FBDA663EAD}" type="datetimeFigureOut">
               <a:rPr lang="en-US" smtClean="0"/>
               <a:pPr/>
-              <a:t>8/26/2020</a:t>
+              <a:t>4/5/2021</a:t>
             </a:fld>
             <a:endParaRPr lang="en-US" dirty="0"/>
           </a:p>
@@ -2442,7 +2442,7 @@
             <a:fld id="{818F800F-9FA6-FE45-B974-AB17141DF911}" type="datetimeFigureOut">
               <a:rPr lang="en-US" smtClean="0"/>
               <a:pPr/>
-              <a:t>8/26/2020</a:t>
+              <a:t>4/5/2021</a:t>
             </a:fld>
             <a:endParaRPr lang="en-US" dirty="0"/>
           </a:p>
@@ -2839,7 +2839,7 @@
             <a:fld id="{818F800F-9FA6-FE45-B974-AB17141DF911}" type="datetimeFigureOut">
               <a:rPr lang="en-US" smtClean="0"/>
               <a:pPr/>
-              <a:t>8/26/2020</a:t>
+              <a:t>4/5/2021</a:t>
             </a:fld>
             <a:endParaRPr lang="en-US" dirty="0"/>
           </a:p>
@@ -3129,7 +3129,7 @@
             <a:fld id="{818F800F-9FA6-FE45-B974-AB17141DF911}" type="datetimeFigureOut">
               <a:rPr lang="en-US" smtClean="0"/>
               <a:pPr/>
-              <a:t>8/26/2020</a:t>
+              <a:t>4/5/2021</a:t>
             </a:fld>
             <a:endParaRPr lang="en-US" dirty="0"/>
           </a:p>
@@ -3553,7 +3553,7 @@
             <a:fld id="{818F800F-9FA6-FE45-B974-AB17141DF911}" type="datetimeFigureOut">
               <a:rPr lang="en-US" smtClean="0"/>
               <a:pPr/>
-              <a:t>8/26/2020</a:t>
+              <a:t>4/5/2021</a:t>
             </a:fld>
             <a:endParaRPr lang="en-US" dirty="0"/>
           </a:p>
@@ -3673,7 +3673,7 @@
             <a:fld id="{818F800F-9FA6-FE45-B974-AB17141DF911}" type="datetimeFigureOut">
               <a:rPr lang="en-US" smtClean="0"/>
               <a:pPr/>
-              <a:t>8/26/2020</a:t>
+              <a:t>4/5/2021</a:t>
             </a:fld>
             <a:endParaRPr lang="en-US" dirty="0"/>
           </a:p>
@@ -4024,7 +4024,7 @@
             <a:fld id="{818F800F-9FA6-FE45-B974-AB17141DF911}" type="datetimeFigureOut">
               <a:rPr lang="en-US" smtClean="0"/>
               <a:pPr/>
-              <a:t>8/26/2020</a:t>
+              <a:t>4/5/2021</a:t>
             </a:fld>
             <a:endParaRPr lang="en-US" dirty="0"/>
           </a:p>

</xml_diff>